<commit_message>
add search diagram in the presentation
</commit_message>
<xml_diff>
--- a/caméra.pptx
+++ b/caméra.pptx
@@ -6,7 +6,8 @@
   </p:sldMasterIdLst>
   <p:sldIdLst>
     <p:sldId id="256" r:id="rId2"/>
-    <p:sldId id="257" r:id="rId3"/>
+    <p:sldId id="258" r:id="rId3"/>
+    <p:sldId id="257" r:id="rId4"/>
   </p:sldIdLst>
   <p:sldSz cx="12192000" cy="6858000"/>
   <p:notesSz cx="6858000" cy="9144000"/>
@@ -262,7 +263,7 @@
           <a:p>
             <a:fld id="{20DA81B0-82CC-4F00-8759-EE48F19A2E3F}" type="datetimeFigureOut">
               <a:rPr lang="fr-TN" smtClean="0"/>
-              <a:t>18/03/2025</a:t>
+              <a:t>20/03/2025</a:t>
             </a:fld>
             <a:endParaRPr lang="fr-TN"/>
           </a:p>
@@ -462,7 +463,7 @@
           <a:p>
             <a:fld id="{20DA81B0-82CC-4F00-8759-EE48F19A2E3F}" type="datetimeFigureOut">
               <a:rPr lang="fr-TN" smtClean="0"/>
-              <a:t>18/03/2025</a:t>
+              <a:t>20/03/2025</a:t>
             </a:fld>
             <a:endParaRPr lang="fr-TN"/>
           </a:p>
@@ -672,7 +673,7 @@
           <a:p>
             <a:fld id="{20DA81B0-82CC-4F00-8759-EE48F19A2E3F}" type="datetimeFigureOut">
               <a:rPr lang="fr-TN" smtClean="0"/>
-              <a:t>18/03/2025</a:t>
+              <a:t>20/03/2025</a:t>
             </a:fld>
             <a:endParaRPr lang="fr-TN"/>
           </a:p>
@@ -872,7 +873,7 @@
           <a:p>
             <a:fld id="{20DA81B0-82CC-4F00-8759-EE48F19A2E3F}" type="datetimeFigureOut">
               <a:rPr lang="fr-TN" smtClean="0"/>
-              <a:t>18/03/2025</a:t>
+              <a:t>20/03/2025</a:t>
             </a:fld>
             <a:endParaRPr lang="fr-TN"/>
           </a:p>
@@ -1148,7 +1149,7 @@
           <a:p>
             <a:fld id="{20DA81B0-82CC-4F00-8759-EE48F19A2E3F}" type="datetimeFigureOut">
               <a:rPr lang="fr-TN" smtClean="0"/>
-              <a:t>18/03/2025</a:t>
+              <a:t>20/03/2025</a:t>
             </a:fld>
             <a:endParaRPr lang="fr-TN"/>
           </a:p>
@@ -1416,7 +1417,7 @@
           <a:p>
             <a:fld id="{20DA81B0-82CC-4F00-8759-EE48F19A2E3F}" type="datetimeFigureOut">
               <a:rPr lang="fr-TN" smtClean="0"/>
-              <a:t>18/03/2025</a:t>
+              <a:t>20/03/2025</a:t>
             </a:fld>
             <a:endParaRPr lang="fr-TN"/>
           </a:p>
@@ -1831,7 +1832,7 @@
           <a:p>
             <a:fld id="{20DA81B0-82CC-4F00-8759-EE48F19A2E3F}" type="datetimeFigureOut">
               <a:rPr lang="fr-TN" smtClean="0"/>
-              <a:t>18/03/2025</a:t>
+              <a:t>20/03/2025</a:t>
             </a:fld>
             <a:endParaRPr lang="fr-TN"/>
           </a:p>
@@ -1973,7 +1974,7 @@
           <a:p>
             <a:fld id="{20DA81B0-82CC-4F00-8759-EE48F19A2E3F}" type="datetimeFigureOut">
               <a:rPr lang="fr-TN" smtClean="0"/>
-              <a:t>18/03/2025</a:t>
+              <a:t>20/03/2025</a:t>
             </a:fld>
             <a:endParaRPr lang="fr-TN"/>
           </a:p>
@@ -2086,7 +2087,7 @@
           <a:p>
             <a:fld id="{20DA81B0-82CC-4F00-8759-EE48F19A2E3F}" type="datetimeFigureOut">
               <a:rPr lang="fr-TN" smtClean="0"/>
-              <a:t>18/03/2025</a:t>
+              <a:t>20/03/2025</a:t>
             </a:fld>
             <a:endParaRPr lang="fr-TN"/>
           </a:p>
@@ -2399,7 +2400,7 @@
           <a:p>
             <a:fld id="{20DA81B0-82CC-4F00-8759-EE48F19A2E3F}" type="datetimeFigureOut">
               <a:rPr lang="fr-TN" smtClean="0"/>
-              <a:t>18/03/2025</a:t>
+              <a:t>20/03/2025</a:t>
             </a:fld>
             <a:endParaRPr lang="fr-TN"/>
           </a:p>
@@ -2688,7 +2689,7 @@
           <a:p>
             <a:fld id="{20DA81B0-82CC-4F00-8759-EE48F19A2E3F}" type="datetimeFigureOut">
               <a:rPr lang="fr-TN" smtClean="0"/>
-              <a:t>18/03/2025</a:t>
+              <a:t>20/03/2025</a:t>
             </a:fld>
             <a:endParaRPr lang="fr-TN"/>
           </a:p>
@@ -2931,7 +2932,7 @@
           <a:p>
             <a:fld id="{20DA81B0-82CC-4F00-8759-EE48F19A2E3F}" type="datetimeFigureOut">
               <a:rPr lang="fr-TN" smtClean="0"/>
-              <a:t>18/03/2025</a:t>
+              <a:t>20/03/2025</a:t>
             </a:fld>
             <a:endParaRPr lang="fr-TN"/>
           </a:p>
@@ -4283,6 +4284,320 @@
   <p:cSld>
     <p:spTree>
       <p:nvGrpSpPr>
+        <p:cNvPr id="1" name=""/>
+        <p:cNvGrpSpPr/>
+        <p:nvPr/>
+      </p:nvGrpSpPr>
+      <p:grpSpPr>
+        <a:xfrm>
+          <a:off x="0" y="0"/>
+          <a:ext cx="0" cy="0"/>
+          <a:chOff x="0" y="0"/>
+          <a:chExt cx="0" cy="0"/>
+        </a:xfrm>
+      </p:grpSpPr>
+      <p:sp>
+        <p:nvSpPr>
+          <p:cNvPr id="4" name="Rectangle 3">
+            <a:extLst>
+              <a:ext uri="{FF2B5EF4-FFF2-40B4-BE49-F238E27FC236}">
+                <a16:creationId xmlns:a16="http://schemas.microsoft.com/office/drawing/2014/main" id="{0BD0B7C3-9F5D-4B58-98B7-13B1DAEC79EA}"/>
+              </a:ext>
+            </a:extLst>
+          </p:cNvPr>
+          <p:cNvSpPr/>
+          <p:nvPr/>
+        </p:nvSpPr>
+        <p:spPr>
+          <a:xfrm>
+            <a:off x="2730316" y="1431523"/>
+            <a:ext cx="4547772" cy="3426781"/>
+          </a:xfrm>
+          <a:prstGeom prst="rect">
+            <a:avLst/>
+          </a:prstGeom>
+        </p:spPr>
+        <p:style>
+          <a:lnRef idx="2">
+            <a:schemeClr val="accent1">
+              <a:shade val="15000"/>
+            </a:schemeClr>
+          </a:lnRef>
+          <a:fillRef idx="1">
+            <a:schemeClr val="accent1"/>
+          </a:fillRef>
+          <a:effectRef idx="0">
+            <a:schemeClr val="accent1"/>
+          </a:effectRef>
+          <a:fontRef idx="minor">
+            <a:schemeClr val="lt1"/>
+          </a:fontRef>
+        </p:style>
+        <p:txBody>
+          <a:bodyPr rtlCol="0" anchor="ctr"/>
+          <a:lstStyle/>
+          <a:p>
+            <a:pPr algn="ctr"/>
+            <a:endParaRPr lang="fr-TN" dirty="0"/>
+          </a:p>
+        </p:txBody>
+      </p:sp>
+      <p:sp>
+        <p:nvSpPr>
+          <p:cNvPr id="5" name="Rectangle 4">
+            <a:extLst>
+              <a:ext uri="{FF2B5EF4-FFF2-40B4-BE49-F238E27FC236}">
+                <a16:creationId xmlns:a16="http://schemas.microsoft.com/office/drawing/2014/main" id="{465DC7D1-FE6A-5DD9-3725-F72A4C9A65DD}"/>
+              </a:ext>
+            </a:extLst>
+          </p:cNvPr>
+          <p:cNvSpPr/>
+          <p:nvPr/>
+        </p:nvSpPr>
+        <p:spPr>
+          <a:xfrm>
+            <a:off x="4324799" y="1560733"/>
+            <a:ext cx="2467648" cy="334417"/>
+          </a:xfrm>
+          <a:prstGeom prst="rect">
+            <a:avLst/>
+          </a:prstGeom>
+        </p:spPr>
+        <p:style>
+          <a:lnRef idx="1">
+            <a:schemeClr val="accent1"/>
+          </a:lnRef>
+          <a:fillRef idx="2">
+            <a:schemeClr val="accent1"/>
+          </a:fillRef>
+          <a:effectRef idx="1">
+            <a:schemeClr val="accent1"/>
+          </a:effectRef>
+          <a:fontRef idx="minor">
+            <a:schemeClr val="dk1"/>
+          </a:fontRef>
+        </p:style>
+        <p:txBody>
+          <a:bodyPr rtlCol="0" anchor="ctr"/>
+          <a:lstStyle/>
+          <a:p>
+            <a:pPr algn="ctr"/>
+            <a:r>
+              <a:rPr lang="fr-FR" dirty="0"/>
+              <a:t>Caméra de surveillance</a:t>
+            </a:r>
+            <a:endParaRPr lang="fr-TN" dirty="0"/>
+          </a:p>
+        </p:txBody>
+      </p:sp>
+      <p:sp>
+        <p:nvSpPr>
+          <p:cNvPr id="6" name="Rectangle 5">
+            <a:extLst>
+              <a:ext uri="{FF2B5EF4-FFF2-40B4-BE49-F238E27FC236}">
+                <a16:creationId xmlns:a16="http://schemas.microsoft.com/office/drawing/2014/main" id="{1D8BD15E-CB5E-3E6E-D21D-B3A11A190412}"/>
+              </a:ext>
+            </a:extLst>
+          </p:cNvPr>
+          <p:cNvSpPr/>
+          <p:nvPr/>
+        </p:nvSpPr>
+        <p:spPr>
+          <a:xfrm>
+            <a:off x="2838222" y="1560733"/>
+            <a:ext cx="1387549" cy="334417"/>
+          </a:xfrm>
+          <a:prstGeom prst="rect">
+            <a:avLst/>
+          </a:prstGeom>
+        </p:spPr>
+        <p:style>
+          <a:lnRef idx="1">
+            <a:schemeClr val="accent1"/>
+          </a:lnRef>
+          <a:fillRef idx="2">
+            <a:schemeClr val="accent1"/>
+          </a:fillRef>
+          <a:effectRef idx="1">
+            <a:schemeClr val="accent1"/>
+          </a:effectRef>
+          <a:fontRef idx="minor">
+            <a:schemeClr val="dk1"/>
+          </a:fontRef>
+        </p:style>
+        <p:txBody>
+          <a:bodyPr rtlCol="0" anchor="ctr"/>
+          <a:lstStyle/>
+          <a:p>
+            <a:pPr algn="ctr"/>
+            <a:r>
+              <a:rPr lang="fr-FR" sz="1800" dirty="0"/>
+              <a:t>Historique</a:t>
+            </a:r>
+            <a:endParaRPr lang="fr-TN" dirty="0"/>
+          </a:p>
+        </p:txBody>
+      </p:sp>
+      <p:sp>
+        <p:nvSpPr>
+          <p:cNvPr id="7" name="Rectangle : coins arrondis 6">
+            <a:extLst>
+              <a:ext uri="{FF2B5EF4-FFF2-40B4-BE49-F238E27FC236}">
+                <a16:creationId xmlns:a16="http://schemas.microsoft.com/office/drawing/2014/main" id="{F16C2F6A-49A1-D902-6203-56A4DCAEA2BD}"/>
+              </a:ext>
+            </a:extLst>
+          </p:cNvPr>
+          <p:cNvSpPr/>
+          <p:nvPr/>
+        </p:nvSpPr>
+        <p:spPr>
+          <a:xfrm>
+            <a:off x="3888436" y="2024360"/>
+            <a:ext cx="2038888" cy="334417"/>
+          </a:xfrm>
+          <a:prstGeom prst="roundRect">
+            <a:avLst/>
+          </a:prstGeom>
+        </p:spPr>
+        <p:style>
+          <a:lnRef idx="2">
+            <a:schemeClr val="accent2">
+              <a:shade val="15000"/>
+            </a:schemeClr>
+          </a:lnRef>
+          <a:fillRef idx="1">
+            <a:schemeClr val="accent2"/>
+          </a:fillRef>
+          <a:effectRef idx="0">
+            <a:schemeClr val="accent2"/>
+          </a:effectRef>
+          <a:fontRef idx="minor">
+            <a:schemeClr val="lt1"/>
+          </a:fontRef>
+        </p:style>
+        <p:txBody>
+          <a:bodyPr rtlCol="0" anchor="ctr"/>
+          <a:lstStyle/>
+          <a:p>
+            <a:pPr algn="ctr"/>
+            <a:r>
+              <a:rPr lang="fr-FR" dirty="0"/>
+              <a:t>Recherche </a:t>
+            </a:r>
+            <a:endParaRPr lang="fr-TN" dirty="0"/>
+          </a:p>
+        </p:txBody>
+      </p:sp>
+      <p:sp>
+        <p:nvSpPr>
+          <p:cNvPr id="9" name="Rectangle 8">
+            <a:extLst>
+              <a:ext uri="{FF2B5EF4-FFF2-40B4-BE49-F238E27FC236}">
+                <a16:creationId xmlns:a16="http://schemas.microsoft.com/office/drawing/2014/main" id="{FBFC19E5-AEDF-A71E-09AD-D6DAD29EACF0}"/>
+              </a:ext>
+            </a:extLst>
+          </p:cNvPr>
+          <p:cNvSpPr/>
+          <p:nvPr/>
+        </p:nvSpPr>
+        <p:spPr>
+          <a:xfrm>
+            <a:off x="3959194" y="2445265"/>
+            <a:ext cx="1897371" cy="1967469"/>
+          </a:xfrm>
+          <a:prstGeom prst="rect">
+            <a:avLst/>
+          </a:prstGeom>
+          <a:solidFill>
+            <a:schemeClr val="accent5">
+              <a:lumMod val="60000"/>
+              <a:lumOff val="40000"/>
+            </a:schemeClr>
+          </a:solidFill>
+        </p:spPr>
+        <p:style>
+          <a:lnRef idx="2">
+            <a:schemeClr val="accent1">
+              <a:shade val="15000"/>
+            </a:schemeClr>
+          </a:lnRef>
+          <a:fillRef idx="1">
+            <a:schemeClr val="accent1"/>
+          </a:fillRef>
+          <a:effectRef idx="0">
+            <a:schemeClr val="accent1"/>
+          </a:effectRef>
+          <a:fontRef idx="minor">
+            <a:schemeClr val="lt1"/>
+          </a:fontRef>
+        </p:style>
+        <p:txBody>
+          <a:bodyPr rtlCol="0" anchor="ctr"/>
+          <a:lstStyle/>
+          <a:p>
+            <a:pPr algn="ctr"/>
+            <a:r>
+              <a:rPr lang="fr-FR" dirty="0"/>
+              <a:t>Résulta de recherche</a:t>
+            </a:r>
+            <a:endParaRPr lang="fr-TN" dirty="0"/>
+          </a:p>
+        </p:txBody>
+      </p:sp>
+      <p:pic>
+        <p:nvPicPr>
+          <p:cNvPr id="11" name="Graphique 10" descr="Loupe">
+            <a:extLst>
+              <a:ext uri="{FF2B5EF4-FFF2-40B4-BE49-F238E27FC236}">
+                <a16:creationId xmlns:a16="http://schemas.microsoft.com/office/drawing/2014/main" id="{A480D49F-3B83-DE1D-494E-2EC19D412D4C}"/>
+              </a:ext>
+            </a:extLst>
+          </p:cNvPr>
+          <p:cNvPicPr>
+            <a:picLocks noChangeAspect="1"/>
+          </p:cNvPicPr>
+          <p:nvPr/>
+        </p:nvPicPr>
+        <p:blipFill>
+          <a:blip r:embed="rId2">
+            <a:extLst>
+              <a:ext uri="{96DAC541-7B7A-43D3-8B79-37D633B846F1}">
+                <asvg:svgBlip xmlns:asvg="http://schemas.microsoft.com/office/drawing/2016/SVG/main" r:embed="rId3"/>
+              </a:ext>
+            </a:extLst>
+          </a:blip>
+          <a:stretch>
+            <a:fillRect/>
+          </a:stretch>
+        </p:blipFill>
+        <p:spPr>
+          <a:xfrm>
+            <a:off x="3959194" y="2047306"/>
+            <a:ext cx="288524" cy="288524"/>
+          </a:xfrm>
+          <a:prstGeom prst="rect">
+            <a:avLst/>
+          </a:prstGeom>
+        </p:spPr>
+      </p:pic>
+    </p:spTree>
+    <p:extLst>
+      <p:ext uri="{BB962C8B-B14F-4D97-AF65-F5344CB8AC3E}">
+        <p14:creationId xmlns:p14="http://schemas.microsoft.com/office/powerpoint/2010/main" val="2746690266"/>
+      </p:ext>
+    </p:extLst>
+  </p:cSld>
+  <p:clrMapOvr>
+    <a:masterClrMapping/>
+  </p:clrMapOvr>
+</p:sld>
+</file>
+
+<file path=ppt/slides/slide3.xml><?xml version="1.0" encoding="utf-8"?>
+<p:sld xmlns:a="http://schemas.openxmlformats.org/drawingml/2006/main" xmlns:r="http://schemas.openxmlformats.org/officeDocument/2006/relationships" xmlns:p="http://schemas.openxmlformats.org/presentationml/2006/main">
+  <p:cSld>
+    <p:spTree>
+      <p:nvGrpSpPr>
         <p:cNvPr id="1" name="">
           <a:extLst>
             <a:ext uri="{FF2B5EF4-FFF2-40B4-BE49-F238E27FC236}">

</xml_diff>